<commit_message>
update fastai nlp sequence ppts
</commit_message>
<xml_diff>
--- a/Sequence/fastai_lstm_rnn_timeseries.pptx
+++ b/Sequence/fastai_lstm_rnn_timeseries.pptx
@@ -228,7 +228,7 @@
           <a:p>
             <a:fld id="{43B1B1F9-D0CB-FF4D-BEE0-BED1F1FDA196}" type="datetimeFigureOut">
               <a:rPr lang="en-US" smtClean="0"/>
-              <a:t>4/1/20</a:t>
+              <a:t>4/27/20</a:t>
             </a:fld>
             <a:endParaRPr lang="en-US"/>
           </a:p>
@@ -394,7 +394,7 @@
           <a:p>
             <a:fld id="{26BE012A-D992-5D42-B86E-AA2BC0764EE1}" type="datetimeFigureOut">
               <a:rPr lang="en-US" smtClean="0"/>
-              <a:t>4/1/20</a:t>
+              <a:t>4/27/20</a:t>
             </a:fld>
             <a:endParaRPr lang="en-US"/>
           </a:p>
@@ -25342,31 +25342,6 @@
               <a:rPr lang="de-DE"/>
               <a:t>Replace the footer with text from the PPT-Updater. Instructions are included in that file.</a:t>
             </a:r>
-            <a:endParaRPr lang="en-US"/>
-          </a:p>
-        </p:txBody>
-      </p:sp>
-      <p:sp>
-        <p:nvSpPr>
-          <p:cNvPr id="6" name="Text Placeholder 5">
-            <a:extLst>
-              <a:ext uri="{FF2B5EF4-FFF2-40B4-BE49-F238E27FC236}">
-                <a16:creationId xmlns:a16="http://schemas.microsoft.com/office/drawing/2014/main" id="{18FA2C53-4DD5-6E4B-9E22-45D1416B6585}"/>
-              </a:ext>
-            </a:extLst>
-          </p:cNvPr>
-          <p:cNvSpPr>
-            <a:spLocks noGrp="1"/>
-          </p:cNvSpPr>
-          <p:nvPr>
-            <p:ph type="body" sz="quarter" idx="13"/>
-          </p:nvPr>
-        </p:nvSpPr>
-        <p:spPr/>
-        <p:txBody>
-          <a:bodyPr/>
-          <a:lstStyle/>
-          <a:p>
             <a:endParaRPr lang="en-US"/>
           </a:p>
         </p:txBody>

</xml_diff>